<commit_message>
Updating slides and code
</commit_message>
<xml_diff>
--- a/slides/04 dplyr.pptx
+++ b/slides/04 dplyr.pptx
@@ -242,7 +242,7 @@
           <a:p>
             <a:fld id="{005845AE-ACE1-EC44-8625-84E41CDD46BF}" type="datetimeFigureOut">
               <a:rPr lang="en-US" smtClean="0"/>
-              <a:t>8/21/23</a:t>
+              <a:t>8/25/23</a:t>
             </a:fld>
             <a:endParaRPr lang="en-US"/>
           </a:p>
@@ -408,7 +408,7 @@
           <a:p>
             <a:fld id="{BBB7B6E1-B344-C444-840E-5BCE257718B4}" type="datetimeFigureOut">
               <a:rPr lang="en-US" smtClean="0"/>
-              <a:t>8/21/23</a:t>
+              <a:t>8/25/23</a:t>
             </a:fld>
             <a:endParaRPr lang="en-US"/>
           </a:p>
@@ -8848,10 +8848,10 @@
       </p:sp>
       <p:pic>
         <p:nvPicPr>
-          <p:cNvPr id="6" name="Picture 5" descr="Text&#10;&#10;Description automatically generated">
+          <p:cNvPr id="3" name="Picture 2" descr="A screenshot of a computer code&#10;&#10;Description automatically generated">
             <a:extLst>
               <a:ext uri="{FF2B5EF4-FFF2-40B4-BE49-F238E27FC236}">
-                <a16:creationId xmlns:a16="http://schemas.microsoft.com/office/drawing/2014/main" id="{7E92D541-A138-C846-88F9-6391234F003E}"/>
+                <a16:creationId xmlns:a16="http://schemas.microsoft.com/office/drawing/2014/main" id="{8403B477-70A3-186B-940E-E03B701B2850}"/>
               </a:ext>
             </a:extLst>
           </p:cNvPr>
@@ -8868,8 +8868,8 @@
         </p:blipFill>
         <p:spPr>
           <a:xfrm>
-            <a:off x="2561431" y="1245799"/>
-            <a:ext cx="7069137" cy="2426477"/>
+            <a:off x="307010" y="1920848"/>
+            <a:ext cx="5748462" cy="2861166"/>
           </a:xfrm>
           <a:prstGeom prst="rect">
             <a:avLst/>
@@ -8878,10 +8878,10 @@
       </p:pic>
       <p:pic>
         <p:nvPicPr>
-          <p:cNvPr id="8" name="Picture 7" descr="A close up of text on a white background&#10;&#10;Description automatically generated">
+          <p:cNvPr id="9" name="Picture 8" descr="A screenshot of a computer program&#10;&#10;Description automatically generated">
             <a:extLst>
               <a:ext uri="{FF2B5EF4-FFF2-40B4-BE49-F238E27FC236}">
-                <a16:creationId xmlns:a16="http://schemas.microsoft.com/office/drawing/2014/main" id="{D5ED1450-8C16-2740-B72A-56942D38AAF9}"/>
+                <a16:creationId xmlns:a16="http://schemas.microsoft.com/office/drawing/2014/main" id="{251D1549-D6CE-7987-334D-AC75DFA4DAE7}"/>
               </a:ext>
             </a:extLst>
           </p:cNvPr>
@@ -8892,13 +8892,13 @@
         </p:nvPicPr>
         <p:blipFill rotWithShape="1">
           <a:blip r:embed="rId4"/>
-          <a:srcRect b="39219"/>
+          <a:srcRect b="43767"/>
           <a:stretch/>
         </p:blipFill>
         <p:spPr>
           <a:xfrm>
-            <a:off x="2561431" y="3672276"/>
-            <a:ext cx="5658001" cy="2628512"/>
+            <a:off x="6055472" y="1920848"/>
+            <a:ext cx="5748463" cy="2781300"/>
           </a:xfrm>
           <a:prstGeom prst="rect">
             <a:avLst/>

</xml_diff>